<commit_message>
Changed the nanogrid representation
</commit_message>
<xml_diff>
--- a/Arrows/Arrows Original.pptx
+++ b/Arrows/Arrows Original.pptx
@@ -262,7 +262,7 @@
           <a:p>
             <a:fld id="{C5362342-90DB-455E-9946-CF5D77B8AEFF}" type="datetimeFigureOut">
               <a:rPr lang="en-US" smtClean="0"/>
-              <a:t>12/9/2019</a:t>
+              <a:t>12/12/2019</a:t>
             </a:fld>
             <a:endParaRPr lang="en-US"/>
           </a:p>
@@ -460,7 +460,7 @@
           <a:p>
             <a:fld id="{C5362342-90DB-455E-9946-CF5D77B8AEFF}" type="datetimeFigureOut">
               <a:rPr lang="en-US" smtClean="0"/>
-              <a:t>12/9/2019</a:t>
+              <a:t>12/12/2019</a:t>
             </a:fld>
             <a:endParaRPr lang="en-US"/>
           </a:p>
@@ -668,7 +668,7 @@
           <a:p>
             <a:fld id="{C5362342-90DB-455E-9946-CF5D77B8AEFF}" type="datetimeFigureOut">
               <a:rPr lang="en-US" smtClean="0"/>
-              <a:t>12/9/2019</a:t>
+              <a:t>12/12/2019</a:t>
             </a:fld>
             <a:endParaRPr lang="en-US"/>
           </a:p>
@@ -866,7 +866,7 @@
           <a:p>
             <a:fld id="{C5362342-90DB-455E-9946-CF5D77B8AEFF}" type="datetimeFigureOut">
               <a:rPr lang="en-US" smtClean="0"/>
-              <a:t>12/9/2019</a:t>
+              <a:t>12/12/2019</a:t>
             </a:fld>
             <a:endParaRPr lang="en-US"/>
           </a:p>
@@ -1141,7 +1141,7 @@
           <a:p>
             <a:fld id="{C5362342-90DB-455E-9946-CF5D77B8AEFF}" type="datetimeFigureOut">
               <a:rPr lang="en-US" smtClean="0"/>
-              <a:t>12/9/2019</a:t>
+              <a:t>12/12/2019</a:t>
             </a:fld>
             <a:endParaRPr lang="en-US"/>
           </a:p>
@@ -1406,7 +1406,7 @@
           <a:p>
             <a:fld id="{C5362342-90DB-455E-9946-CF5D77B8AEFF}" type="datetimeFigureOut">
               <a:rPr lang="en-US" smtClean="0"/>
-              <a:t>12/9/2019</a:t>
+              <a:t>12/12/2019</a:t>
             </a:fld>
             <a:endParaRPr lang="en-US"/>
           </a:p>
@@ -1818,7 +1818,7 @@
           <a:p>
             <a:fld id="{C5362342-90DB-455E-9946-CF5D77B8AEFF}" type="datetimeFigureOut">
               <a:rPr lang="en-US" smtClean="0"/>
-              <a:t>12/9/2019</a:t>
+              <a:t>12/12/2019</a:t>
             </a:fld>
             <a:endParaRPr lang="en-US"/>
           </a:p>
@@ -1959,7 +1959,7 @@
           <a:p>
             <a:fld id="{C5362342-90DB-455E-9946-CF5D77B8AEFF}" type="datetimeFigureOut">
               <a:rPr lang="en-US" smtClean="0"/>
-              <a:t>12/9/2019</a:t>
+              <a:t>12/12/2019</a:t>
             </a:fld>
             <a:endParaRPr lang="en-US"/>
           </a:p>
@@ -2072,7 +2072,7 @@
           <a:p>
             <a:fld id="{C5362342-90DB-455E-9946-CF5D77B8AEFF}" type="datetimeFigureOut">
               <a:rPr lang="en-US" smtClean="0"/>
-              <a:t>12/9/2019</a:t>
+              <a:t>12/12/2019</a:t>
             </a:fld>
             <a:endParaRPr lang="en-US"/>
           </a:p>
@@ -2383,7 +2383,7 @@
           <a:p>
             <a:fld id="{C5362342-90DB-455E-9946-CF5D77B8AEFF}" type="datetimeFigureOut">
               <a:rPr lang="en-US" smtClean="0"/>
-              <a:t>12/9/2019</a:t>
+              <a:t>12/12/2019</a:t>
             </a:fld>
             <a:endParaRPr lang="en-US"/>
           </a:p>
@@ -2671,7 +2671,7 @@
           <a:p>
             <a:fld id="{C5362342-90DB-455E-9946-CF5D77B8AEFF}" type="datetimeFigureOut">
               <a:rPr lang="en-US" smtClean="0"/>
-              <a:t>12/9/2019</a:t>
+              <a:t>12/12/2019</a:t>
             </a:fld>
             <a:endParaRPr lang="en-US"/>
           </a:p>
@@ -2912,7 +2912,7 @@
           <a:p>
             <a:fld id="{C5362342-90DB-455E-9946-CF5D77B8AEFF}" type="datetimeFigureOut">
               <a:rPr lang="en-US" smtClean="0"/>
-              <a:t>12/9/2019</a:t>
+              <a:t>12/12/2019</a:t>
             </a:fld>
             <a:endParaRPr lang="en-US"/>
           </a:p>
@@ -17374,7 +17374,7 @@
             <a:avLst/>
           </a:prstGeom>
           <a:solidFill>
-            <a:srgbClr val="212121"/>
+            <a:srgbClr val="343434"/>
           </a:solidFill>
           <a:ln>
             <a:noFill/>
@@ -17756,7 +17756,7 @@
             <a:avLst/>
           </a:prstGeom>
           <a:solidFill>
-            <a:srgbClr val="212121"/>
+            <a:srgbClr val="343434"/>
           </a:solidFill>
           <a:ln>
             <a:noFill/>
@@ -18138,7 +18138,7 @@
             <a:avLst/>
           </a:prstGeom>
           <a:solidFill>
-            <a:srgbClr val="212121"/>
+            <a:srgbClr val="343434"/>
           </a:solidFill>
           <a:ln>
             <a:noFill/>
@@ -18520,7 +18520,7 @@
             <a:avLst/>
           </a:prstGeom>
           <a:solidFill>
-            <a:srgbClr val="212121"/>
+            <a:srgbClr val="343434"/>
           </a:solidFill>
           <a:ln>
             <a:noFill/>
@@ -18902,7 +18902,7 @@
             <a:avLst/>
           </a:prstGeom>
           <a:solidFill>
-            <a:srgbClr val="212121"/>
+            <a:srgbClr val="343434"/>
           </a:solidFill>
           <a:ln>
             <a:noFill/>
@@ -19284,7 +19284,7 @@
             <a:avLst/>
           </a:prstGeom>
           <a:solidFill>
-            <a:srgbClr val="212121"/>
+            <a:srgbClr val="343434"/>
           </a:solidFill>
           <a:ln>
             <a:noFill/>
@@ -19666,7 +19666,7 @@
             <a:avLst/>
           </a:prstGeom>
           <a:solidFill>
-            <a:srgbClr val="212121"/>
+            <a:srgbClr val="343434"/>
           </a:solidFill>
           <a:ln>
             <a:noFill/>
@@ -20048,7 +20048,7 @@
             <a:avLst/>
           </a:prstGeom>
           <a:solidFill>
-            <a:srgbClr val="212121"/>
+            <a:srgbClr val="343434"/>
           </a:solidFill>
           <a:ln>
             <a:noFill/>
@@ -20430,7 +20430,7 @@
             <a:avLst/>
           </a:prstGeom>
           <a:solidFill>
-            <a:srgbClr val="212121"/>
+            <a:srgbClr val="343434"/>
           </a:solidFill>
           <a:ln>
             <a:noFill/>
@@ -20812,7 +20812,7 @@
             <a:avLst/>
           </a:prstGeom>
           <a:solidFill>
-            <a:srgbClr val="212121"/>
+            <a:srgbClr val="343434"/>
           </a:solidFill>
           <a:ln>
             <a:noFill/>
@@ -20864,7 +20864,7 @@
             <a:avLst/>
           </a:prstGeom>
           <a:solidFill>
-            <a:srgbClr val="212121"/>
+            <a:srgbClr val="343434"/>
           </a:solidFill>
           <a:ln>
             <a:noFill/>
@@ -21246,7 +21246,7 @@
             <a:avLst/>
           </a:prstGeom>
           <a:solidFill>
-            <a:srgbClr val="212121"/>
+            <a:srgbClr val="343434"/>
           </a:solidFill>
           <a:ln>
             <a:noFill/>
@@ -21628,7 +21628,7 @@
             <a:avLst/>
           </a:prstGeom>
           <a:solidFill>
-            <a:srgbClr val="212121"/>
+            <a:srgbClr val="343434"/>
           </a:solidFill>
           <a:ln>
             <a:noFill/>
@@ -22010,7 +22010,7 @@
             <a:avLst/>
           </a:prstGeom>
           <a:solidFill>
-            <a:srgbClr val="212121"/>
+            <a:srgbClr val="343434"/>
           </a:solidFill>
           <a:ln>
             <a:noFill/>
@@ -22392,7 +22392,7 @@
             <a:avLst/>
           </a:prstGeom>
           <a:solidFill>
-            <a:srgbClr val="212121"/>
+            <a:srgbClr val="343434"/>
           </a:solidFill>
           <a:ln>
             <a:noFill/>
@@ -22774,7 +22774,7 @@
             <a:avLst/>
           </a:prstGeom>
           <a:solidFill>
-            <a:srgbClr val="212121"/>
+            <a:srgbClr val="343434"/>
           </a:solidFill>
           <a:ln>
             <a:noFill/>
@@ -23156,7 +23156,7 @@
             <a:avLst/>
           </a:prstGeom>
           <a:solidFill>
-            <a:srgbClr val="212121"/>
+            <a:srgbClr val="343434"/>
           </a:solidFill>
           <a:ln>
             <a:noFill/>
@@ -23538,7 +23538,7 @@
             <a:avLst/>
           </a:prstGeom>
           <a:solidFill>
-            <a:srgbClr val="212121"/>
+            <a:srgbClr val="343434"/>
           </a:solidFill>
           <a:ln>
             <a:noFill/>
@@ -23920,7 +23920,7 @@
             <a:avLst/>
           </a:prstGeom>
           <a:solidFill>
-            <a:srgbClr val="212121"/>
+            <a:srgbClr val="343434"/>
           </a:solidFill>
           <a:ln>
             <a:noFill/>

</xml_diff>